<commit_message>
Added Damp and Test Desiderata reference.
</commit_message>
<xml_diff>
--- a/!Test Driven Development.pptx
+++ b/!Test Driven Development.pptx
@@ -226,7 +226,7 @@
           <a:p>
             <a:fld id="{8C576CB7-23EC-4DFC-81A5-EEBDA0557B2C}" type="datetimeFigureOut">
               <a:rPr lang="en-AU" smtClean="0"/>
-              <a:t>16/10/2018</a:t>
+              <a:t>11/03/2021</a:t>
             </a:fld>
             <a:endParaRPr lang="en-AU"/>
           </a:p>
@@ -1046,6 +1046,12 @@
           <a:p>
             <a:r>
               <a:rPr lang="en-AU" b="1" dirty="0"/>
+              <a:t>Damp = You cant expect the 8 year old to have read the prequel. </a:t>
+            </a:r>
+          </a:p>
+          <a:p>
+            <a:r>
+              <a:rPr lang="en-AU" b="1" dirty="0"/>
               <a:t>Tests Matter = More Important than Production Code?</a:t>
             </a:r>
           </a:p>
@@ -1085,7 +1091,7 @@
           <a:p>
             <a:r>
               <a:rPr lang="en-AU" dirty="0"/>
-              <a:t>Arrange: Keep it simple, you are telling a story</a:t>
+              <a:t>Arrange: Keep it simple, you are telling a story, imagine your trying to describe something to an 8 year old.</a:t>
             </a:r>
           </a:p>
           <a:p>
@@ -1098,6 +1104,16 @@
             <a:r>
               <a:rPr lang="en-AU" dirty="0"/>
               <a:t>Assert: One assert per test, because you are testing 1 thing and proving 1 thing is correct….But you can break this rule if it helps simplify your tests and lowers your code maintenance.</a:t>
+            </a:r>
+          </a:p>
+          <a:p>
+            <a:r>
+              <a:rPr lang="en-AU" dirty="0"/>
+              <a:t>Damp – Not dry. </a:t>
+            </a:r>
+            <a:r>
+              <a:rPr lang="en-AU" b="0" dirty="0"/>
+              <a:t>We need to know why Jack and Jill went up the hill. Don’t start with Something happened in a different story (see reference) and Jill fell down and broke her crown.</a:t>
             </a:r>
           </a:p>
           <a:p>
@@ -3523,15 +3539,7 @@
           <a:p>
             <a:r>
               <a:rPr lang="en-AU" b="0" dirty="0"/>
-              <a:t>Workflows (Bug Tracking, </a:t>
-            </a:r>
-            <a:r>
-              <a:rPr lang="en-AU" b="0" dirty="0" err="1"/>
-              <a:t>Requeustioning</a:t>
-            </a:r>
-            <a:r>
-              <a:rPr lang="en-AU" b="0" dirty="0"/>
-              <a:t> Approval)</a:t>
+              <a:t>Workflows (Bug Tracking, Requestioning Approval)</a:t>
             </a:r>
           </a:p>
           <a:p>
@@ -3543,15 +3551,7 @@
           <a:p>
             <a:r>
               <a:rPr lang="en-AU" b="0" dirty="0"/>
-              <a:t>Importing Files (Xml, </a:t>
-            </a:r>
-            <a:r>
-              <a:rPr lang="en-AU" b="0" dirty="0" err="1"/>
-              <a:t>Json</a:t>
-            </a:r>
-            <a:r>
-              <a:rPr lang="en-AU" b="0" dirty="0"/>
-              <a:t>, CSV)</a:t>
+              <a:t>Importing Files (Xml, Json, CSV)</a:t>
             </a:r>
           </a:p>
           <a:p>
@@ -4757,9 +4757,12 @@
             </a:r>
           </a:p>
           <a:p>
-            <a:r>
-              <a:rPr lang="en-AU" dirty="0"/>
-              <a:t>Assert: Aim for 1 assert per test, this is the rule, but for simplicity rules can be broken. </a:t>
+            <a:endParaRPr lang="en-AU" dirty="0"/>
+          </a:p>
+          <a:p>
+            <a:r>
+              <a:rPr lang="en-AU" dirty="0"/>
+              <a:t>* Assert: Aim for 1 assert per test, this is the rule, but for simplicity rules can be broken. </a:t>
             </a:r>
           </a:p>
         </p:txBody>
@@ -5195,7 +5198,7 @@
           <a:p>
             <a:fld id="{7353DB3B-488C-4107-AF55-F3558AC15F8F}" type="datetimeFigureOut">
               <a:rPr lang="en-AU" smtClean="0"/>
-              <a:t>16/10/2018</a:t>
+              <a:t>11/03/2021</a:t>
             </a:fld>
             <a:endParaRPr lang="en-AU"/>
           </a:p>
@@ -5395,7 +5398,7 @@
           <a:p>
             <a:fld id="{7353DB3B-488C-4107-AF55-F3558AC15F8F}" type="datetimeFigureOut">
               <a:rPr lang="en-AU" smtClean="0"/>
-              <a:t>16/10/2018</a:t>
+              <a:t>11/03/2021</a:t>
             </a:fld>
             <a:endParaRPr lang="en-AU"/>
           </a:p>
@@ -5605,7 +5608,7 @@
           <a:p>
             <a:fld id="{7353DB3B-488C-4107-AF55-F3558AC15F8F}" type="datetimeFigureOut">
               <a:rPr lang="en-AU" smtClean="0"/>
-              <a:t>16/10/2018</a:t>
+              <a:t>11/03/2021</a:t>
             </a:fld>
             <a:endParaRPr lang="en-AU"/>
           </a:p>
@@ -5805,7 +5808,7 @@
           <a:p>
             <a:fld id="{7353DB3B-488C-4107-AF55-F3558AC15F8F}" type="datetimeFigureOut">
               <a:rPr lang="en-AU" smtClean="0"/>
-              <a:t>16/10/2018</a:t>
+              <a:t>11/03/2021</a:t>
             </a:fld>
             <a:endParaRPr lang="en-AU"/>
           </a:p>
@@ -6081,7 +6084,7 @@
           <a:p>
             <a:fld id="{7353DB3B-488C-4107-AF55-F3558AC15F8F}" type="datetimeFigureOut">
               <a:rPr lang="en-AU" smtClean="0"/>
-              <a:t>16/10/2018</a:t>
+              <a:t>11/03/2021</a:t>
             </a:fld>
             <a:endParaRPr lang="en-AU"/>
           </a:p>
@@ -6349,7 +6352,7 @@
           <a:p>
             <a:fld id="{7353DB3B-488C-4107-AF55-F3558AC15F8F}" type="datetimeFigureOut">
               <a:rPr lang="en-AU" smtClean="0"/>
-              <a:t>16/10/2018</a:t>
+              <a:t>11/03/2021</a:t>
             </a:fld>
             <a:endParaRPr lang="en-AU"/>
           </a:p>
@@ -6764,7 +6767,7 @@
           <a:p>
             <a:fld id="{7353DB3B-488C-4107-AF55-F3558AC15F8F}" type="datetimeFigureOut">
               <a:rPr lang="en-AU" smtClean="0"/>
-              <a:t>16/10/2018</a:t>
+              <a:t>11/03/2021</a:t>
             </a:fld>
             <a:endParaRPr lang="en-AU"/>
           </a:p>
@@ -6906,7 +6909,7 @@
           <a:p>
             <a:fld id="{7353DB3B-488C-4107-AF55-F3558AC15F8F}" type="datetimeFigureOut">
               <a:rPr lang="en-AU" smtClean="0"/>
-              <a:t>16/10/2018</a:t>
+              <a:t>11/03/2021</a:t>
             </a:fld>
             <a:endParaRPr lang="en-AU"/>
           </a:p>
@@ -7019,7 +7022,7 @@
           <a:p>
             <a:fld id="{7353DB3B-488C-4107-AF55-F3558AC15F8F}" type="datetimeFigureOut">
               <a:rPr lang="en-AU" smtClean="0"/>
-              <a:t>16/10/2018</a:t>
+              <a:t>11/03/2021</a:t>
             </a:fld>
             <a:endParaRPr lang="en-AU"/>
           </a:p>
@@ -7332,7 +7335,7 @@
           <a:p>
             <a:fld id="{7353DB3B-488C-4107-AF55-F3558AC15F8F}" type="datetimeFigureOut">
               <a:rPr lang="en-AU" smtClean="0"/>
-              <a:t>16/10/2018</a:t>
+              <a:t>11/03/2021</a:t>
             </a:fld>
             <a:endParaRPr lang="en-AU"/>
           </a:p>
@@ -7621,7 +7624,7 @@
           <a:p>
             <a:fld id="{7353DB3B-488C-4107-AF55-F3558AC15F8F}" type="datetimeFigureOut">
               <a:rPr lang="en-AU" smtClean="0"/>
-              <a:t>16/10/2018</a:t>
+              <a:t>11/03/2021</a:t>
             </a:fld>
             <a:endParaRPr lang="en-AU"/>
           </a:p>
@@ -7864,7 +7867,7 @@
           <a:p>
             <a:fld id="{7353DB3B-488C-4107-AF55-F3558AC15F8F}" type="datetimeFigureOut">
               <a:rPr lang="en-AU" smtClean="0"/>
-              <a:t>16/10/2018</a:t>
+              <a:t>11/03/2021</a:t>
             </a:fld>
             <a:endParaRPr lang="en-AU"/>
           </a:p>
@@ -8366,15 +8369,6 @@
             </a:endParaRPr>
           </a:p>
           <a:p>
-            <a:pPr marL="0" indent="0">
-              <a:buNone/>
-            </a:pPr>
-            <a:r>
-              <a:rPr lang="en-AU" dirty="0">
-                <a:hlinkClick r:id="rId4"/>
-              </a:rPr>
-              <a:t>https://twitter.com/JoelViney</a:t>
-            </a:r>
             <a:endParaRPr lang="en-AU" dirty="0"/>
           </a:p>
           <a:p>
@@ -8412,7 +8406,7 @@
           <p:nvPr/>
         </p:nvPicPr>
         <p:blipFill>
-          <a:blip r:embed="rId5">
+          <a:blip r:embed="rId4">
             <a:extLst>
               <a:ext uri="{28A0092B-C50C-407E-A947-70E740481C1C}">
                 <a14:useLocalDpi xmlns:a14="http://schemas.microsoft.com/office/drawing/2010/main" val="0"/>
@@ -8448,7 +8442,7 @@
           <p:nvPr/>
         </p:nvPicPr>
         <p:blipFill>
-          <a:blip r:embed="rId6">
+          <a:blip r:embed="rId5">
             <a:extLst>
               <a:ext uri="{28A0092B-C50C-407E-A947-70E740481C1C}">
                 <a14:useLocalDpi xmlns:a14="http://schemas.microsoft.com/office/drawing/2010/main" val="0"/>
@@ -8964,7 +8958,15 @@
           <a:p>
             <a:r>
               <a:rPr lang="en-US" dirty="0"/>
-              <a:t>Arrange – Keep it simple, you are telling a story</a:t>
+              <a:t>Arrange – KISS. </a:t>
+            </a:r>
+            <a:r>
+              <a:rPr lang="en-US" dirty="0">
+                <a:solidFill>
+                  <a:srgbClr val="FF0000"/>
+                </a:solidFill>
+              </a:rPr>
+              <a:t>You are telling a story to an 8 year old.</a:t>
             </a:r>
           </a:p>
           <a:p>
@@ -8982,19 +8984,19 @@
           <a:p>
             <a:r>
               <a:rPr lang="en-US" dirty="0"/>
+              <a:t>DAMP not DRY – Each story is its own story</a:t>
+            </a:r>
+          </a:p>
+          <a:p>
+            <a:r>
+              <a:rPr lang="en-US" dirty="0"/>
               <a:t>Tests Matter - Treat Test code like you would production code. Maintain and refactor it.</a:t>
             </a:r>
           </a:p>
           <a:p>
             <a:r>
               <a:rPr lang="en-US" dirty="0"/>
-              <a:t>Use Fluid Extensions</a:t>
-            </a:r>
-          </a:p>
-          <a:p>
-            <a:r>
-              <a:rPr lang="en-US" dirty="0"/>
-              <a:t>Keep Tests Short – KISS</a:t>
+              <a:t>Keep Tests Short – KISS, Use Fluid Extensions</a:t>
             </a:r>
           </a:p>
           <a:p>
@@ -10969,7 +10971,7 @@
         <p:spPr/>
         <p:txBody>
           <a:bodyPr>
-            <a:normAutofit/>
+            <a:normAutofit fontScale="92500" lnSpcReduction="20000"/>
           </a:bodyPr>
           <a:lstStyle/>
           <a:p>
@@ -10996,6 +10998,9 @@
             </a:r>
           </a:p>
           <a:p>
+            <a:pPr marL="457200" lvl="1" indent="0">
+              <a:buNone/>
+            </a:pPr>
             <a:r>
               <a:rPr lang="en-AU" dirty="0">
                 <a:solidFill>
@@ -11006,12 +11011,60 @@
             </a:r>
           </a:p>
           <a:p>
+            <a:r>
+              <a:rPr lang="en-AU" dirty="0">
+                <a:solidFill>
+                  <a:schemeClr val="tx2"/>
+                </a:solidFill>
+              </a:rPr>
+              <a:t>Kent Beck – Test Desiderata</a:t>
+            </a:r>
+          </a:p>
+          <a:p>
             <a:pPr marL="457200" lvl="1" indent="0">
               <a:buNone/>
             </a:pPr>
             <a:r>
               <a:rPr lang="en-AU" dirty="0">
+                <a:solidFill>
+                  <a:schemeClr val="tx2"/>
+                </a:solidFill>
                 <a:hlinkClick r:id="rId3"/>
+              </a:rPr>
+              <a:t>https://www.youtube.com/watch?v=5LOdKDqdWYU&amp;list=PLlmVY7qtgT</a:t>
+            </a:r>
+            <a:r>
+              <a:rPr lang="en-AU">
+                <a:solidFill>
+                  <a:schemeClr val="tx2"/>
+                </a:solidFill>
+                <a:hlinkClick r:id="rId3"/>
+              </a:rPr>
+              <a:t>_lkbrk9iZNizp978mVzpBKl</a:t>
+            </a:r>
+            <a:endParaRPr lang="en-AU" dirty="0">
+              <a:solidFill>
+                <a:schemeClr val="tx2"/>
+              </a:solidFill>
+            </a:endParaRPr>
+          </a:p>
+          <a:p>
+            <a:r>
+              <a:rPr lang="en-AU" dirty="0">
+                <a:solidFill>
+                  <a:schemeClr val="tx2"/>
+                </a:solidFill>
+              </a:rPr>
+              <a:t>Unit Tests</a:t>
+            </a:r>
+          </a:p>
+          <a:p>
+            <a:pPr marL="457200" lvl="1" indent="0">
+              <a:buNone/>
+            </a:pPr>
+            <a:r>
+              <a:rPr lang="en-AU" dirty="0">
+                <a:hlinkClick r:id="rId4"/>
               </a:rPr>
               <a:t>https://github.com/JoelViney/TestDrivenTalk</a:t>
             </a:r>
@@ -11033,7 +11086,7 @@
             </a:pPr>
             <a:r>
               <a:rPr lang="en-AU" dirty="0">
-                <a:hlinkClick r:id="rId4"/>
+                <a:hlinkClick r:id="rId5"/>
               </a:rPr>
               <a:t>https://github.com/JoelViney/CorePaginationExample</a:t>
             </a:r>
@@ -11058,7 +11111,7 @@
                 <a:solidFill>
                   <a:schemeClr val="tx2"/>
                 </a:solidFill>
-                <a:hlinkClick r:id="rId5"/>
+                <a:hlinkClick r:id="rId6"/>
               </a:rPr>
               <a:t>https://www.youtube.com/watch?v=UON5Rr_CL2M</a:t>
             </a:r>
@@ -11810,7 +11863,7 @@
             <a:pPr lvl="1"/>
             <a:r>
               <a:rPr lang="en-AU" dirty="0"/>
-              <a:t>Aim for 1 asset per test</a:t>
+              <a:t>Aim for 1 asset per test*</a:t>
             </a:r>
             <a:endParaRPr lang="en-AU" dirty="0">
               <a:solidFill>

</xml_diff>